<commit_message>
[추가] todoPage 설계서, component 추가
</commit_message>
<xml_diff>
--- a/documents/화면설계서/20220614_TodoList(v0.41).pptx
+++ b/documents/화면설계서/20220614_TodoList(v0.41).pptx
@@ -264,7 +264,7 @@
           <a:p>
             <a:fld id="{5898F278-28E9-444D-B2B1-B7A14FF35FDF}" type="datetimeFigureOut">
               <a:rPr lang="ko-KR" altLang="en-US" smtClean="0"/>
-              <a:t>2022-06-14</a:t>
+              <a:t>2022-08-08</a:t>
             </a:fld>
             <a:endParaRPr lang="ko-KR" altLang="en-US"/>
           </a:p>
@@ -462,7 +462,7 @@
           <a:p>
             <a:fld id="{5898F278-28E9-444D-B2B1-B7A14FF35FDF}" type="datetimeFigureOut">
               <a:rPr lang="ko-KR" altLang="en-US" smtClean="0"/>
-              <a:t>2022-06-14</a:t>
+              <a:t>2022-08-08</a:t>
             </a:fld>
             <a:endParaRPr lang="ko-KR" altLang="en-US"/>
           </a:p>
@@ -670,7 +670,7 @@
           <a:p>
             <a:fld id="{5898F278-28E9-444D-B2B1-B7A14FF35FDF}" type="datetimeFigureOut">
               <a:rPr lang="ko-KR" altLang="en-US" smtClean="0"/>
-              <a:t>2022-06-14</a:t>
+              <a:t>2022-08-08</a:t>
             </a:fld>
             <a:endParaRPr lang="ko-KR" altLang="en-US"/>
           </a:p>
@@ -868,7 +868,7 @@
           <a:p>
             <a:fld id="{5898F278-28E9-444D-B2B1-B7A14FF35FDF}" type="datetimeFigureOut">
               <a:rPr lang="ko-KR" altLang="en-US" smtClean="0"/>
-              <a:t>2022-06-14</a:t>
+              <a:t>2022-08-08</a:t>
             </a:fld>
             <a:endParaRPr lang="ko-KR" altLang="en-US"/>
           </a:p>
@@ -1143,7 +1143,7 @@
           <a:p>
             <a:fld id="{5898F278-28E9-444D-B2B1-B7A14FF35FDF}" type="datetimeFigureOut">
               <a:rPr lang="ko-KR" altLang="en-US" smtClean="0"/>
-              <a:t>2022-06-14</a:t>
+              <a:t>2022-08-08</a:t>
             </a:fld>
             <a:endParaRPr lang="ko-KR" altLang="en-US"/>
           </a:p>
@@ -1408,7 +1408,7 @@
           <a:p>
             <a:fld id="{5898F278-28E9-444D-B2B1-B7A14FF35FDF}" type="datetimeFigureOut">
               <a:rPr lang="ko-KR" altLang="en-US" smtClean="0"/>
-              <a:t>2022-06-14</a:t>
+              <a:t>2022-08-08</a:t>
             </a:fld>
             <a:endParaRPr lang="ko-KR" altLang="en-US"/>
           </a:p>
@@ -1820,7 +1820,7 @@
           <a:p>
             <a:fld id="{5898F278-28E9-444D-B2B1-B7A14FF35FDF}" type="datetimeFigureOut">
               <a:rPr lang="ko-KR" altLang="en-US" smtClean="0"/>
-              <a:t>2022-06-14</a:t>
+              <a:t>2022-08-08</a:t>
             </a:fld>
             <a:endParaRPr lang="ko-KR" altLang="en-US"/>
           </a:p>
@@ -1961,7 +1961,7 @@
           <a:p>
             <a:fld id="{5898F278-28E9-444D-B2B1-B7A14FF35FDF}" type="datetimeFigureOut">
               <a:rPr lang="ko-KR" altLang="en-US" smtClean="0"/>
-              <a:t>2022-06-14</a:t>
+              <a:t>2022-08-08</a:t>
             </a:fld>
             <a:endParaRPr lang="ko-KR" altLang="en-US"/>
           </a:p>
@@ -2074,7 +2074,7 @@
           <a:p>
             <a:fld id="{5898F278-28E9-444D-B2B1-B7A14FF35FDF}" type="datetimeFigureOut">
               <a:rPr lang="ko-KR" altLang="en-US" smtClean="0"/>
-              <a:t>2022-06-14</a:t>
+              <a:t>2022-08-08</a:t>
             </a:fld>
             <a:endParaRPr lang="ko-KR" altLang="en-US"/>
           </a:p>
@@ -2385,7 +2385,7 @@
           <a:p>
             <a:fld id="{5898F278-28E9-444D-B2B1-B7A14FF35FDF}" type="datetimeFigureOut">
               <a:rPr lang="ko-KR" altLang="en-US" smtClean="0"/>
-              <a:t>2022-06-14</a:t>
+              <a:t>2022-08-08</a:t>
             </a:fld>
             <a:endParaRPr lang="ko-KR" altLang="en-US"/>
           </a:p>
@@ -2673,7 +2673,7 @@
           <a:p>
             <a:fld id="{5898F278-28E9-444D-B2B1-B7A14FF35FDF}" type="datetimeFigureOut">
               <a:rPr lang="ko-KR" altLang="en-US" smtClean="0"/>
-              <a:t>2022-06-14</a:t>
+              <a:t>2022-08-08</a:t>
             </a:fld>
             <a:endParaRPr lang="ko-KR" altLang="en-US"/>
           </a:p>
@@ -2914,7 +2914,7 @@
           <a:p>
             <a:fld id="{5898F278-28E9-444D-B2B1-B7A14FF35FDF}" type="datetimeFigureOut">
               <a:rPr lang="ko-KR" altLang="en-US" smtClean="0"/>
-              <a:t>2022-06-14</a:t>
+              <a:t>2022-08-08</a:t>
             </a:fld>
             <a:endParaRPr lang="ko-KR" altLang="en-US"/>
           </a:p>

</xml_diff>